<commit_message>
Updates to slides. 2022
</commit_message>
<xml_diff>
--- a/slides/ch07-RandomNumbersAndRC4.pptx
+++ b/slides/ch07-RandomNumbersAndRC4.pptx
@@ -31,7 +31,7 @@
     <p:sldId id="294" r:id="rId22"/>
     <p:sldId id="274" r:id="rId23"/>
   </p:sldIdLst>
-  <p:sldSz cx="9144000" cy="6858000" type="screen4x3"/>
+  <p:sldSz cx="12192000" cy="6858000"/>
   <p:notesSz cx="6858000" cy="9144000"/>
   <p:defaultTextStyle>
     <a:defPPr>
@@ -161,12 +161,12 @@
   <p:extLst>
     <p:ext uri="{EFAFB233-063F-42B5-8137-9DF3F51BA10A}">
       <p15:sldGuideLst xmlns:p15="http://schemas.microsoft.com/office/powerpoint/2012/main">
-        <p15:guide id="1" orient="horz" pos="2160">
+        <p15:guide id="1" orient="horz" pos="2160" userDrawn="1">
           <p15:clr>
             <a:srgbClr val="A4A3A4"/>
           </p15:clr>
         </p15:guide>
-        <p15:guide id="2" pos="2880">
+        <p15:guide id="2" pos="3840" userDrawn="1">
           <p15:clr>
             <a:srgbClr val="A4A3A4"/>
           </p15:clr>
@@ -336,7 +336,7 @@
             </a:extLst>
           </p:cNvPr>
           <p:cNvSpPr>
-            <a:spLocks noRot="1" noChangeArrowheads="1" noTextEdit="1"/>
+            <a:spLocks noGrp="1" noRot="1" noChangeAspect="1" noChangeArrowheads="1" noTextEdit="1"/>
           </p:cNvSpPr>
           <p:nvPr>
             <p:ph type="sldImg" idx="2"/>
@@ -344,8 +344,8 @@
         </p:nvSpPr>
         <p:spPr bwMode="auto">
           <a:xfrm>
-            <a:off x="1143000" y="685800"/>
-            <a:ext cx="4572000" cy="3429000"/>
+            <a:off x="381000" y="685800"/>
+            <a:ext cx="6096000" cy="3429000"/>
           </a:xfrm>
           <a:prstGeom prst="rect">
             <a:avLst/>
@@ -898,13 +898,17 @@
             </a:extLst>
           </p:cNvPr>
           <p:cNvSpPr>
-            <a:spLocks noChangeArrowheads="1" noTextEdit="1"/>
+            <a:spLocks noGrp="1" noRot="1" noChangeAspect="1" noChangeArrowheads="1" noTextEdit="1"/>
           </p:cNvSpPr>
           <p:nvPr>
             <p:ph type="sldImg"/>
           </p:nvPr>
         </p:nvSpPr>
         <p:spPr>
+          <a:xfrm>
+            <a:off x="381000" y="685800"/>
+            <a:ext cx="6096000" cy="3429000"/>
+          </a:xfrm>
           <a:solidFill>
             <a:srgbClr val="FFFFFF"/>
           </a:solidFill>
@@ -921,7 +925,7 @@
             </a:extLst>
           </p:cNvPr>
           <p:cNvSpPr>
-            <a:spLocks noChangeArrowheads="1"/>
+            <a:spLocks noGrp="1" noChangeArrowheads="1"/>
           </p:cNvSpPr>
           <p:nvPr>
             <p:ph type="body" idx="1"/>
@@ -1190,13 +1194,17 @@
             </a:extLst>
           </p:cNvPr>
           <p:cNvSpPr>
-            <a:spLocks noRot="1" noChangeArrowheads="1" noTextEdit="1"/>
+            <a:spLocks noGrp="1" noRot="1" noChangeAspect="1" noChangeArrowheads="1" noTextEdit="1"/>
           </p:cNvSpPr>
           <p:nvPr>
             <p:ph type="sldImg"/>
           </p:nvPr>
         </p:nvSpPr>
         <p:spPr>
+          <a:xfrm>
+            <a:off x="381000" y="685800"/>
+            <a:ext cx="6096000" cy="3429000"/>
+          </a:xfrm>
           <a:ln/>
         </p:spPr>
       </p:sp>
@@ -1481,13 +1489,17 @@
             </a:extLst>
           </p:cNvPr>
           <p:cNvSpPr>
-            <a:spLocks noRot="1" noChangeArrowheads="1" noTextEdit="1"/>
+            <a:spLocks noGrp="1" noRot="1" noChangeAspect="1" noChangeArrowheads="1" noTextEdit="1"/>
           </p:cNvSpPr>
           <p:nvPr>
             <p:ph type="sldImg"/>
           </p:nvPr>
         </p:nvSpPr>
         <p:spPr>
+          <a:xfrm>
+            <a:off x="381000" y="685800"/>
+            <a:ext cx="6096000" cy="3429000"/>
+          </a:xfrm>
           <a:ln/>
         </p:spPr>
       </p:sp>
@@ -1808,13 +1820,17 @@
             </a:extLst>
           </p:cNvPr>
           <p:cNvSpPr>
-            <a:spLocks noChangeArrowheads="1" noTextEdit="1"/>
+            <a:spLocks noGrp="1" noRot="1" noChangeAspect="1" noChangeArrowheads="1" noTextEdit="1"/>
           </p:cNvSpPr>
           <p:nvPr>
             <p:ph type="sldImg"/>
           </p:nvPr>
         </p:nvSpPr>
         <p:spPr>
+          <a:xfrm>
+            <a:off x="381000" y="685800"/>
+            <a:ext cx="6096000" cy="3429000"/>
+          </a:xfrm>
           <a:solidFill>
             <a:srgbClr val="FFFFFF"/>
           </a:solidFill>
@@ -1831,7 +1847,7 @@
             </a:extLst>
           </p:cNvPr>
           <p:cNvSpPr>
-            <a:spLocks noChangeArrowheads="1"/>
+            <a:spLocks noGrp="1" noChangeArrowheads="1"/>
           </p:cNvSpPr>
           <p:nvPr>
             <p:ph type="body" idx="1"/>
@@ -2163,13 +2179,17 @@
             </a:extLst>
           </p:cNvPr>
           <p:cNvSpPr>
-            <a:spLocks noRot="1" noChangeArrowheads="1" noTextEdit="1"/>
+            <a:spLocks noGrp="1" noRot="1" noChangeAspect="1" noChangeArrowheads="1" noTextEdit="1"/>
           </p:cNvSpPr>
           <p:nvPr>
             <p:ph type="sldImg"/>
           </p:nvPr>
         </p:nvSpPr>
         <p:spPr>
+          <a:xfrm>
+            <a:off x="381000" y="685800"/>
+            <a:ext cx="6096000" cy="3429000"/>
+          </a:xfrm>
           <a:ln/>
         </p:spPr>
       </p:sp>
@@ -2506,13 +2526,17 @@
             </a:extLst>
           </p:cNvPr>
           <p:cNvSpPr>
-            <a:spLocks noRot="1" noChangeArrowheads="1" noTextEdit="1"/>
+            <a:spLocks noGrp="1" noRot="1" noChangeAspect="1" noChangeArrowheads="1" noTextEdit="1"/>
           </p:cNvSpPr>
           <p:nvPr>
             <p:ph type="sldImg"/>
           </p:nvPr>
         </p:nvSpPr>
         <p:spPr>
+          <a:xfrm>
+            <a:off x="381000" y="685800"/>
+            <a:ext cx="6096000" cy="3429000"/>
+          </a:xfrm>
           <a:ln/>
         </p:spPr>
       </p:sp>
@@ -2786,13 +2810,17 @@
             </a:extLst>
           </p:cNvPr>
           <p:cNvSpPr>
-            <a:spLocks noRot="1" noChangeArrowheads="1" noTextEdit="1"/>
+            <a:spLocks noGrp="1" noRot="1" noChangeAspect="1" noChangeArrowheads="1" noTextEdit="1"/>
           </p:cNvSpPr>
           <p:nvPr>
             <p:ph type="sldImg"/>
           </p:nvPr>
         </p:nvSpPr>
         <p:spPr>
+          <a:xfrm>
+            <a:off x="381000" y="685800"/>
+            <a:ext cx="6096000" cy="3429000"/>
+          </a:xfrm>
           <a:ln/>
         </p:spPr>
       </p:sp>
@@ -3120,13 +3148,17 @@
             </a:extLst>
           </p:cNvPr>
           <p:cNvSpPr>
-            <a:spLocks noRot="1" noChangeArrowheads="1" noTextEdit="1"/>
+            <a:spLocks noGrp="1" noRot="1" noChangeAspect="1" noChangeArrowheads="1" noTextEdit="1"/>
           </p:cNvSpPr>
           <p:nvPr>
             <p:ph type="sldImg"/>
           </p:nvPr>
         </p:nvSpPr>
         <p:spPr>
+          <a:xfrm>
+            <a:off x="381000" y="685800"/>
+            <a:ext cx="6096000" cy="3429000"/>
+          </a:xfrm>
           <a:ln/>
         </p:spPr>
       </p:sp>
@@ -3412,13 +3444,17 @@
             </a:extLst>
           </p:cNvPr>
           <p:cNvSpPr>
-            <a:spLocks noRot="1" noChangeArrowheads="1" noTextEdit="1"/>
+            <a:spLocks noGrp="1" noRot="1" noChangeAspect="1" noChangeArrowheads="1" noTextEdit="1"/>
           </p:cNvSpPr>
           <p:nvPr>
             <p:ph type="sldImg"/>
           </p:nvPr>
         </p:nvSpPr>
         <p:spPr>
+          <a:xfrm>
+            <a:off x="381000" y="685800"/>
+            <a:ext cx="6096000" cy="3429000"/>
+          </a:xfrm>
           <a:ln/>
         </p:spPr>
       </p:sp>
@@ -3698,13 +3734,17 @@
             </a:extLst>
           </p:cNvPr>
           <p:cNvSpPr>
-            <a:spLocks noRot="1" noChangeArrowheads="1" noTextEdit="1"/>
+            <a:spLocks noGrp="1" noRot="1" noChangeAspect="1" noChangeArrowheads="1" noTextEdit="1"/>
           </p:cNvSpPr>
           <p:nvPr>
             <p:ph type="sldImg"/>
           </p:nvPr>
         </p:nvSpPr>
         <p:spPr>
+          <a:xfrm>
+            <a:off x="381000" y="685800"/>
+            <a:ext cx="6096000" cy="3429000"/>
+          </a:xfrm>
           <a:ln/>
         </p:spPr>
       </p:sp>
@@ -3981,13 +4021,17 @@
             </a:extLst>
           </p:cNvPr>
           <p:cNvSpPr>
-            <a:spLocks noChangeArrowheads="1" noTextEdit="1"/>
+            <a:spLocks noGrp="1" noRot="1" noChangeAspect="1" noChangeArrowheads="1" noTextEdit="1"/>
           </p:cNvSpPr>
           <p:nvPr>
             <p:ph type="sldImg"/>
           </p:nvPr>
         </p:nvSpPr>
         <p:spPr>
+          <a:xfrm>
+            <a:off x="381000" y="685800"/>
+            <a:ext cx="6096000" cy="3429000"/>
+          </a:xfrm>
           <a:solidFill>
             <a:srgbClr val="FFFFFF"/>
           </a:solidFill>
@@ -4004,7 +4048,7 @@
             </a:extLst>
           </p:cNvPr>
           <p:cNvSpPr>
-            <a:spLocks noChangeArrowheads="1"/>
+            <a:spLocks noGrp="1" noChangeArrowheads="1"/>
           </p:cNvSpPr>
           <p:nvPr>
             <p:ph type="body" idx="1"/>
@@ -4267,13 +4311,17 @@
             </a:extLst>
           </p:cNvPr>
           <p:cNvSpPr>
-            <a:spLocks noRot="1" noChangeArrowheads="1" noTextEdit="1"/>
+            <a:spLocks noGrp="1" noRot="1" noChangeAspect="1" noChangeArrowheads="1" noTextEdit="1"/>
           </p:cNvSpPr>
           <p:nvPr>
             <p:ph type="sldImg"/>
           </p:nvPr>
         </p:nvSpPr>
         <p:spPr>
+          <a:xfrm>
+            <a:off x="381000" y="685800"/>
+            <a:ext cx="6096000" cy="3429000"/>
+          </a:xfrm>
           <a:ln/>
         </p:spPr>
       </p:sp>
@@ -4547,13 +4595,17 @@
             </a:extLst>
           </p:cNvPr>
           <p:cNvSpPr>
-            <a:spLocks noRot="1" noChangeArrowheads="1" noTextEdit="1"/>
+            <a:spLocks noGrp="1" noRot="1" noChangeAspect="1" noChangeArrowheads="1" noTextEdit="1"/>
           </p:cNvSpPr>
           <p:nvPr>
             <p:ph type="sldImg"/>
           </p:nvPr>
         </p:nvSpPr>
         <p:spPr>
+          <a:xfrm>
+            <a:off x="381000" y="685800"/>
+            <a:ext cx="6096000" cy="3429000"/>
+          </a:xfrm>
           <a:ln/>
         </p:spPr>
       </p:sp>
@@ -4852,13 +4904,17 @@
             </a:extLst>
           </p:cNvPr>
           <p:cNvSpPr>
-            <a:spLocks noRot="1" noChangeArrowheads="1" noTextEdit="1"/>
+            <a:spLocks noGrp="1" noRot="1" noChangeAspect="1" noChangeArrowheads="1" noTextEdit="1"/>
           </p:cNvSpPr>
           <p:nvPr>
             <p:ph type="sldImg"/>
           </p:nvPr>
         </p:nvSpPr>
         <p:spPr>
+          <a:xfrm>
+            <a:off x="381000" y="685800"/>
+            <a:ext cx="6096000" cy="3429000"/>
+          </a:xfrm>
           <a:ln/>
         </p:spPr>
       </p:sp>
@@ -5132,13 +5188,17 @@
             </a:extLst>
           </p:cNvPr>
           <p:cNvSpPr>
-            <a:spLocks noRot="1" noChangeArrowheads="1" noTextEdit="1"/>
+            <a:spLocks noGrp="1" noRot="1" noChangeAspect="1" noChangeArrowheads="1" noTextEdit="1"/>
           </p:cNvSpPr>
           <p:nvPr>
             <p:ph type="sldImg"/>
           </p:nvPr>
         </p:nvSpPr>
         <p:spPr>
+          <a:xfrm>
+            <a:off x="381000" y="685800"/>
+            <a:ext cx="6096000" cy="3429000"/>
+          </a:xfrm>
           <a:ln/>
         </p:spPr>
       </p:sp>
@@ -5275,6 +5335,10 @@
           </p:nvPr>
         </p:nvSpPr>
         <p:spPr>
+          <a:xfrm>
+            <a:off x="381000" y="685800"/>
+            <a:ext cx="6096000" cy="3429000"/>
+          </a:xfrm>
           <a:ln/>
         </p:spPr>
       </p:sp>
@@ -5800,13 +5864,17 @@
             </a:extLst>
           </p:cNvPr>
           <p:cNvSpPr>
-            <a:spLocks noRot="1" noChangeArrowheads="1" noTextEdit="1"/>
+            <a:spLocks noGrp="1" noRot="1" noChangeAspect="1" noChangeArrowheads="1" noTextEdit="1"/>
           </p:cNvSpPr>
           <p:nvPr>
             <p:ph type="sldImg"/>
           </p:nvPr>
         </p:nvSpPr>
         <p:spPr>
+          <a:xfrm>
+            <a:off x="381000" y="685800"/>
+            <a:ext cx="6096000" cy="3429000"/>
+          </a:xfrm>
           <a:ln/>
         </p:spPr>
       </p:sp>
@@ -6091,13 +6159,17 @@
             </a:extLst>
           </p:cNvPr>
           <p:cNvSpPr>
-            <a:spLocks noRot="1" noChangeArrowheads="1" noTextEdit="1"/>
+            <a:spLocks noGrp="1" noRot="1" noChangeAspect="1" noChangeArrowheads="1" noTextEdit="1"/>
           </p:cNvSpPr>
           <p:nvPr>
             <p:ph type="sldImg"/>
           </p:nvPr>
         </p:nvSpPr>
         <p:spPr>
+          <a:xfrm>
+            <a:off x="381000" y="685800"/>
+            <a:ext cx="6096000" cy="3429000"/>
+          </a:xfrm>
           <a:ln/>
         </p:spPr>
       </p:sp>
@@ -6371,13 +6443,17 @@
             </a:extLst>
           </p:cNvPr>
           <p:cNvSpPr>
-            <a:spLocks noRot="1" noChangeArrowheads="1" noTextEdit="1"/>
+            <a:spLocks noGrp="1" noRot="1" noChangeAspect="1" noChangeArrowheads="1" noTextEdit="1"/>
           </p:cNvSpPr>
           <p:nvPr>
             <p:ph type="sldImg"/>
           </p:nvPr>
         </p:nvSpPr>
         <p:spPr>
+          <a:xfrm>
+            <a:off x="381000" y="685800"/>
+            <a:ext cx="6096000" cy="3429000"/>
+          </a:xfrm>
           <a:ln/>
         </p:spPr>
       </p:sp>
@@ -6484,6 +6560,10 @@
           </p:nvPr>
         </p:nvSpPr>
         <p:spPr>
+          <a:xfrm>
+            <a:off x="381000" y="685800"/>
+            <a:ext cx="6096000" cy="3429000"/>
+          </a:xfrm>
           <a:ln/>
         </p:spPr>
       </p:sp>
@@ -6978,13 +7058,17 @@
             </a:extLst>
           </p:cNvPr>
           <p:cNvSpPr>
-            <a:spLocks noRot="1" noChangeArrowheads="1" noTextEdit="1"/>
+            <a:spLocks noGrp="1" noRot="1" noChangeAspect="1" noChangeArrowheads="1" noTextEdit="1"/>
           </p:cNvSpPr>
           <p:nvPr>
             <p:ph type="sldImg"/>
           </p:nvPr>
         </p:nvSpPr>
         <p:spPr>
+          <a:xfrm>
+            <a:off x="381000" y="685800"/>
+            <a:ext cx="6096000" cy="3429000"/>
+          </a:xfrm>
           <a:ln/>
         </p:spPr>
       </p:sp>
@@ -7092,8 +7176,8 @@
         </p:nvSpPr>
         <p:spPr>
           <a:xfrm>
-            <a:off x="685800" y="2130425"/>
-            <a:ext cx="7772400" cy="1470025"/>
+            <a:off x="914400" y="2130426"/>
+            <a:ext cx="10363200" cy="1470025"/>
           </a:xfrm>
         </p:spPr>
         <p:txBody>
@@ -7119,8 +7203,8 @@
         </p:nvSpPr>
         <p:spPr>
           <a:xfrm>
-            <a:off x="1371600" y="3886200"/>
-            <a:ext cx="6400800" cy="1752600"/>
+            <a:off x="1828800" y="3886200"/>
+            <a:ext cx="8534400" cy="1752600"/>
           </a:xfrm>
         </p:spPr>
         <p:txBody>
@@ -7576,8 +7660,8 @@
         </p:nvSpPr>
         <p:spPr>
           <a:xfrm>
-            <a:off x="6629400" y="274638"/>
-            <a:ext cx="2057400" cy="5851525"/>
+            <a:off x="8839200" y="274639"/>
+            <a:ext cx="2743200" cy="5851525"/>
           </a:xfrm>
         </p:spPr>
         <p:txBody>
@@ -7603,8 +7687,8 @@
         </p:nvSpPr>
         <p:spPr>
           <a:xfrm>
-            <a:off x="457200" y="274638"/>
-            <a:ext cx="6019800" cy="5851525"/>
+            <a:off x="609600" y="274639"/>
+            <a:ext cx="8026400" cy="5851525"/>
           </a:xfrm>
         </p:spPr>
         <p:txBody>
@@ -7998,8 +8082,8 @@
         </p:nvSpPr>
         <p:spPr>
           <a:xfrm>
-            <a:off x="722313" y="4406900"/>
-            <a:ext cx="7772400" cy="1362075"/>
+            <a:off x="963084" y="4406901"/>
+            <a:ext cx="10363200" cy="1362075"/>
           </a:xfrm>
         </p:spPr>
         <p:txBody>
@@ -8029,8 +8113,8 @@
         </p:nvSpPr>
         <p:spPr>
           <a:xfrm>
-            <a:off x="722313" y="2906713"/>
-            <a:ext cx="7772400" cy="1500187"/>
+            <a:off x="963084" y="2906713"/>
+            <a:ext cx="10363200" cy="1500187"/>
           </a:xfrm>
         </p:spPr>
         <p:txBody>
@@ -8303,8 +8387,8 @@
         </p:nvSpPr>
         <p:spPr>
           <a:xfrm>
-            <a:off x="457200" y="1600200"/>
-            <a:ext cx="4038600" cy="4525963"/>
+            <a:off x="609600" y="1600201"/>
+            <a:ext cx="5384800" cy="4525963"/>
           </a:xfrm>
         </p:spPr>
         <p:txBody>
@@ -8387,8 +8471,8 @@
         </p:nvSpPr>
         <p:spPr>
           <a:xfrm>
-            <a:off x="4648200" y="1600200"/>
-            <a:ext cx="4038600" cy="4525963"/>
+            <a:off x="6197600" y="1600201"/>
+            <a:ext cx="5384800" cy="4525963"/>
           </a:xfrm>
         </p:spPr>
         <p:txBody>
@@ -8630,8 +8714,8 @@
         </p:nvSpPr>
         <p:spPr>
           <a:xfrm>
-            <a:off x="457200" y="1535113"/>
-            <a:ext cx="4040188" cy="639762"/>
+            <a:off x="609600" y="1535113"/>
+            <a:ext cx="5386917" cy="639762"/>
           </a:xfrm>
         </p:spPr>
         <p:txBody>
@@ -8695,8 +8779,8 @@
         </p:nvSpPr>
         <p:spPr>
           <a:xfrm>
-            <a:off x="457200" y="2174875"/>
-            <a:ext cx="4040188" cy="3951288"/>
+            <a:off x="609600" y="2174875"/>
+            <a:ext cx="5386917" cy="3951288"/>
           </a:xfrm>
         </p:spPr>
         <p:txBody>
@@ -8779,8 +8863,8 @@
         </p:nvSpPr>
         <p:spPr>
           <a:xfrm>
-            <a:off x="4645025" y="1535113"/>
-            <a:ext cx="4041775" cy="639762"/>
+            <a:off x="6193368" y="1535113"/>
+            <a:ext cx="5389033" cy="639762"/>
           </a:xfrm>
         </p:spPr>
         <p:txBody>
@@ -8844,8 +8928,8 @@
         </p:nvSpPr>
         <p:spPr>
           <a:xfrm>
-            <a:off x="4645025" y="2174875"/>
-            <a:ext cx="4041775" cy="3951288"/>
+            <a:off x="6193368" y="2174875"/>
+            <a:ext cx="5389033" cy="3951288"/>
           </a:xfrm>
         </p:spPr>
         <p:txBody>
@@ -9349,8 +9433,8 @@
         </p:nvSpPr>
         <p:spPr>
           <a:xfrm>
-            <a:off x="457200" y="273050"/>
-            <a:ext cx="3008313" cy="1162050"/>
+            <a:off x="609601" y="273050"/>
+            <a:ext cx="4011084" cy="1162050"/>
           </a:xfrm>
         </p:spPr>
         <p:txBody>
@@ -9380,8 +9464,8 @@
         </p:nvSpPr>
         <p:spPr>
           <a:xfrm>
-            <a:off x="3575050" y="273050"/>
-            <a:ext cx="5111750" cy="5853113"/>
+            <a:off x="4766733" y="273051"/>
+            <a:ext cx="6815667" cy="5853113"/>
           </a:xfrm>
         </p:spPr>
         <p:txBody>
@@ -9464,8 +9548,8 @@
         </p:nvSpPr>
         <p:spPr>
           <a:xfrm>
-            <a:off x="457200" y="1435100"/>
-            <a:ext cx="3008313" cy="4691063"/>
+            <a:off x="609601" y="1435101"/>
+            <a:ext cx="4011084" cy="4691063"/>
           </a:xfrm>
         </p:spPr>
         <p:txBody>
@@ -9662,8 +9746,8 @@
         </p:nvSpPr>
         <p:spPr>
           <a:xfrm>
-            <a:off x="1792288" y="4800600"/>
-            <a:ext cx="5486400" cy="566738"/>
+            <a:off x="2389717" y="4800600"/>
+            <a:ext cx="7315200" cy="566738"/>
           </a:xfrm>
         </p:spPr>
         <p:txBody>
@@ -9693,8 +9777,8 @@
         </p:nvSpPr>
         <p:spPr>
           <a:xfrm>
-            <a:off x="1792288" y="612775"/>
-            <a:ext cx="5486400" cy="4114800"/>
+            <a:off x="2389717" y="612775"/>
+            <a:ext cx="7315200" cy="4114800"/>
           </a:xfrm>
         </p:spPr>
         <p:txBody>
@@ -9757,8 +9841,8 @@
         </p:nvSpPr>
         <p:spPr>
           <a:xfrm>
-            <a:off x="1792288" y="5367338"/>
-            <a:ext cx="5486400" cy="804862"/>
+            <a:off x="2389717" y="5367338"/>
+            <a:ext cx="7315200" cy="804862"/>
           </a:xfrm>
         </p:spPr>
         <p:txBody>
@@ -9969,8 +10053,8 @@
         </p:nvSpPr>
         <p:spPr bwMode="auto">
           <a:xfrm>
-            <a:off x="457200" y="274638"/>
-            <a:ext cx="8229600" cy="1143000"/>
+            <a:off x="609600" y="274638"/>
+            <a:ext cx="10972800" cy="1143000"/>
           </a:xfrm>
           <a:prstGeom prst="rect">
             <a:avLst/>
@@ -10033,8 +10117,8 @@
         </p:nvSpPr>
         <p:spPr bwMode="auto">
           <a:xfrm>
-            <a:off x="457200" y="1600200"/>
-            <a:ext cx="8229600" cy="4525963"/>
+            <a:off x="609600" y="1600201"/>
+            <a:ext cx="10972800" cy="4525963"/>
           </a:xfrm>
           <a:prstGeom prst="rect">
             <a:avLst/>
@@ -10125,8 +10209,8 @@
         </p:nvSpPr>
         <p:spPr>
           <a:xfrm>
-            <a:off x="457200" y="6356350"/>
-            <a:ext cx="2133600" cy="365125"/>
+            <a:off x="609600" y="6356351"/>
+            <a:ext cx="2844800" cy="365125"/>
           </a:xfrm>
           <a:prstGeom prst="rect">
             <a:avLst/>
@@ -10171,8 +10255,8 @@
         </p:nvSpPr>
         <p:spPr>
           <a:xfrm>
-            <a:off x="3124200" y="6356350"/>
-            <a:ext cx="2895600" cy="365125"/>
+            <a:off x="4165600" y="6356351"/>
+            <a:ext cx="3860800" cy="365125"/>
           </a:xfrm>
           <a:prstGeom prst="rect">
             <a:avLst/>
@@ -10217,8 +10301,8 @@
         </p:nvSpPr>
         <p:spPr>
           <a:xfrm>
-            <a:off x="6553200" y="6356350"/>
-            <a:ext cx="2133600" cy="365125"/>
+            <a:off x="8737600" y="6356351"/>
+            <a:ext cx="2844800" cy="365125"/>
           </a:xfrm>
           <a:prstGeom prst="rect">
             <a:avLst/>
@@ -10687,7 +10771,7 @@
         </p:nvSpPr>
         <p:spPr>
           <a:xfrm>
-            <a:off x="838200" y="457200"/>
+            <a:off x="2362200" y="457201"/>
             <a:ext cx="7848600" cy="2765425"/>
           </a:xfrm>
         </p:spPr>
@@ -10737,7 +10821,7 @@
         </p:nvSpPr>
         <p:spPr>
           <a:xfrm>
-            <a:off x="1476375" y="3429000"/>
+            <a:off x="3000375" y="3429001"/>
             <a:ext cx="6400800" cy="2671763"/>
           </a:xfrm>
         </p:spPr>
@@ -10751,8 +10835,6 @@
               <a:spcAft>
                 <a:spcPts val="0"/>
               </a:spcAft>
-              <a:buFont typeface="Wingdings" pitchFamily="2" charset="2"/>
-              <a:buNone/>
               <a:defRPr/>
             </a:pPr>
             <a:r>
@@ -10767,8 +10849,6 @@
               <a:spcAft>
                 <a:spcPts val="0"/>
               </a:spcAft>
-              <a:buFont typeface="Wingdings" pitchFamily="2" charset="2"/>
-              <a:buNone/>
               <a:defRPr/>
             </a:pPr>
             <a:r>
@@ -10783,8 +10863,6 @@
               <a:spcAft>
                 <a:spcPts val="0"/>
               </a:spcAft>
-              <a:buFont typeface="Wingdings" pitchFamily="2" charset="2"/>
-              <a:buNone/>
               <a:defRPr/>
             </a:pPr>
             <a:endParaRPr lang="en-US" dirty="0">
@@ -10796,8 +10874,6 @@
               <a:spcAft>
                 <a:spcPts val="0"/>
               </a:spcAft>
-              <a:buFont typeface="Wingdings" pitchFamily="2" charset="2"/>
-              <a:buNone/>
               <a:defRPr/>
             </a:pPr>
             <a:r>
@@ -10950,7 +11026,6 @@
               <a:spcAft>
                 <a:spcPts val="0"/>
               </a:spcAft>
-              <a:buFont typeface="Wingdings" pitchFamily="2" charset="2"/>
               <a:buNone/>
               <a:defRPr/>
             </a:pPr>
@@ -11734,7 +11809,7 @@
         </p:blipFill>
         <p:spPr bwMode="auto">
           <a:xfrm>
-            <a:off x="3657600" y="3429000"/>
+            <a:off x="5181601" y="3429001"/>
             <a:ext cx="4714875" cy="2701925"/>
           </a:xfrm>
           <a:prstGeom prst="rect">
@@ -11855,7 +11930,7 @@
         </p:blipFill>
         <p:spPr bwMode="auto">
           <a:xfrm>
-            <a:off x="838200" y="1447800"/>
+            <a:off x="2362200" y="1447800"/>
             <a:ext cx="7539038" cy="5016500"/>
           </a:xfrm>
           <a:prstGeom prst="rect">
@@ -11966,7 +12041,7 @@
         </p:nvSpPr>
         <p:spPr>
           <a:xfrm>
-            <a:off x="457200" y="1676400"/>
+            <a:off x="1981200" y="1676401"/>
             <a:ext cx="8458200" cy="4454525"/>
           </a:xfrm>
         </p:spPr>
@@ -12230,7 +12305,7 @@
         </p:blipFill>
         <p:spPr bwMode="auto">
           <a:xfrm>
-            <a:off x="533400" y="1981200"/>
+            <a:off x="2057400" y="1981201"/>
             <a:ext cx="8216900" cy="3990975"/>
           </a:xfrm>
           <a:prstGeom prst="rect">
@@ -12658,7 +12733,7 @@
         </p:nvSpPr>
         <p:spPr>
           <a:xfrm>
-            <a:off x="457200" y="1676400"/>
+            <a:off x="1981200" y="1676400"/>
             <a:ext cx="8229600" cy="4724400"/>
           </a:xfrm>
         </p:spPr>
@@ -13153,7 +13228,7 @@
         </p:nvSpPr>
         <p:spPr>
           <a:xfrm>
-            <a:off x="457200" y="304800"/>
+            <a:off x="1981200" y="304800"/>
             <a:ext cx="8229600" cy="1428750"/>
           </a:xfrm>
         </p:spPr>
@@ -13192,7 +13267,7 @@
         </p:nvSpPr>
         <p:spPr>
           <a:xfrm>
-            <a:off x="457200" y="1905000"/>
+            <a:off x="1981200" y="1905000"/>
             <a:ext cx="8534400" cy="4648200"/>
           </a:xfrm>
         </p:spPr>
@@ -13209,7 +13284,6 @@
               <a:spcAft>
                 <a:spcPts val="0"/>
               </a:spcAft>
-              <a:buFont typeface="Wingdings" pitchFamily="2" charset="2"/>
               <a:buNone/>
               <a:defRPr/>
             </a:pPr>
@@ -13228,7 +13302,6 @@
               <a:spcAft>
                 <a:spcPts val="0"/>
               </a:spcAft>
-              <a:buFont typeface="Wingdings" pitchFamily="2" charset="2"/>
               <a:buNone/>
               <a:defRPr/>
             </a:pPr>
@@ -13247,7 +13320,6 @@
               <a:spcAft>
                 <a:spcPts val="0"/>
               </a:spcAft>
-              <a:buFont typeface="Wingdings" pitchFamily="2" charset="2"/>
               <a:buNone/>
               <a:defRPr/>
             </a:pPr>
@@ -13328,7 +13400,7 @@
         </p:nvSpPr>
         <p:spPr>
           <a:xfrm>
-            <a:off x="381000" y="0"/>
+            <a:off x="1905000" y="1"/>
             <a:ext cx="8229600" cy="1139825"/>
           </a:xfrm>
         </p:spPr>
@@ -13375,7 +13447,7 @@
         </p:blipFill>
         <p:spPr bwMode="auto">
           <a:xfrm>
-            <a:off x="685800" y="1066800"/>
+            <a:off x="2209801" y="1066800"/>
             <a:ext cx="7650163" cy="5638800"/>
           </a:xfrm>
           <a:prstGeom prst="rect">
@@ -13761,7 +13833,7 @@
         </p:nvSpPr>
         <p:spPr>
           <a:xfrm>
-            <a:off x="457200" y="1676400"/>
+            <a:off x="1981200" y="1676400"/>
             <a:ext cx="8229600" cy="4953000"/>
           </a:xfrm>
         </p:spPr>
@@ -13924,7 +13996,7 @@
         </p:nvSpPr>
         <p:spPr>
           <a:xfrm>
-            <a:off x="457200" y="277813"/>
+            <a:off x="1981200" y="277814"/>
             <a:ext cx="8229600" cy="1322387"/>
           </a:xfrm>
         </p:spPr>
@@ -13981,7 +14053,7 @@
         </p:blipFill>
         <p:spPr bwMode="auto">
           <a:xfrm>
-            <a:off x="1066800" y="2209800"/>
+            <a:off x="2590800" y="2209800"/>
             <a:ext cx="6616700" cy="3429000"/>
           </a:xfrm>
           <a:prstGeom prst="rect">
@@ -14088,7 +14160,7 @@
         </p:nvSpPr>
         <p:spPr>
           <a:xfrm>
-            <a:off x="457200" y="1676400"/>
+            <a:off x="1981200" y="1676400"/>
             <a:ext cx="8229600" cy="5029200"/>
           </a:xfrm>
         </p:spPr>
@@ -14632,7 +14704,7 @@
         </p:nvSpPr>
         <p:spPr>
           <a:xfrm>
-            <a:off x="457200" y="1676400"/>
+            <a:off x="1981200" y="1676400"/>
             <a:ext cx="8229600" cy="4876800"/>
           </a:xfrm>
         </p:spPr>
@@ -14806,7 +14878,7 @@
         </p:nvSpPr>
         <p:spPr>
           <a:xfrm>
-            <a:off x="523875" y="1484313"/>
+            <a:off x="2047875" y="1484314"/>
             <a:ext cx="8008938" cy="4465637"/>
           </a:xfrm>
         </p:spPr>
@@ -14865,7 +14937,7 @@
         </p:blipFill>
         <p:spPr bwMode="auto">
           <a:xfrm>
-            <a:off x="5940425" y="4291013"/>
+            <a:off x="7464426" y="4291013"/>
             <a:ext cx="2962275" cy="2292350"/>
           </a:xfrm>
           <a:prstGeom prst="rect">

</xml_diff>